<commit_message>
included link analysis python code and slides, updated README
</commit_message>
<xml_diff>
--- a/Slides/Model_Prediction_Slides.pptx
+++ b/Slides/Model_Prediction_Slides.pptx
@@ -25302,7 +25302,23 @@
                   <a:schemeClr val="tx1"/>
                 </a:solidFill>
               </a:rPr>
-              <a:t>Year and month the transaction was approved</a:t>
+              <a:t>Year and month the transaction </a:t>
+            </a:r>
+            <a:r>
+              <a:rPr lang="en-SG">
+                <a:solidFill>
+                  <a:schemeClr val="tx1"/>
+                </a:solidFill>
+              </a:rPr>
+              <a:t>was approved or </a:t>
+            </a:r>
+            <a:r>
+              <a:rPr lang="en-SG" dirty="0">
+                <a:solidFill>
+                  <a:schemeClr val="tx1"/>
+                </a:solidFill>
+              </a:rPr>
+              <a:t>registered</a:t>
             </a:r>
           </a:p>
           <a:p>

</xml_diff>

<commit_message>
updates to model prediction slides
</commit_message>
<xml_diff>
--- a/Slides/Model_Prediction_Slides.pptx
+++ b/Slides/Model_Prediction_Slides.pptx
@@ -25987,6 +25987,36 @@
           <a:chExt cx="0" cy="0"/>
         </a:xfrm>
       </p:grpSpPr>
+      <p:pic>
+        <p:nvPicPr>
+          <p:cNvPr id="4" name="Picture 3">
+            <a:extLst>
+              <a:ext uri="{FF2B5EF4-FFF2-40B4-BE49-F238E27FC236}">
+                <a16:creationId xmlns:a16="http://schemas.microsoft.com/office/drawing/2014/main" id="{D11A0644-D442-D15B-53A5-3E7BBB0DB4EB}"/>
+              </a:ext>
+            </a:extLst>
+          </p:cNvPr>
+          <p:cNvPicPr>
+            <a:picLocks noChangeAspect="1"/>
+          </p:cNvPicPr>
+          <p:nvPr/>
+        </p:nvPicPr>
+        <p:blipFill>
+          <a:blip r:embed="rId3"/>
+          <a:stretch>
+            <a:fillRect/>
+          </a:stretch>
+        </p:blipFill>
+        <p:spPr>
+          <a:xfrm>
+            <a:off x="5918662" y="1977782"/>
+            <a:ext cx="3167019" cy="2112793"/>
+          </a:xfrm>
+          <a:prstGeom prst="rect">
+            <a:avLst/>
+          </a:prstGeom>
+        </p:spPr>
+      </p:pic>
       <p:sp>
         <p:nvSpPr>
           <p:cNvPr id="6" name="Title 5">
@@ -26191,7 +26221,7 @@
           <p:nvPr/>
         </p:nvPicPr>
         <p:blipFill>
-          <a:blip r:embed="rId3" cstate="hqprint">
+          <a:blip r:embed="rId4" cstate="hqprint">
             <a:extLst>
               <a:ext uri="{28A0092B-C50C-407E-A947-70E740481C1C}">
                 <a14:useLocalDpi xmlns:a14="http://schemas.microsoft.com/office/drawing/2010/main"/>
@@ -26206,36 +26236,6 @@
           <a:xfrm>
             <a:off x="78858" y="1453401"/>
             <a:ext cx="2412123" cy="2412123"/>
-          </a:xfrm>
-          <a:prstGeom prst="rect">
-            <a:avLst/>
-          </a:prstGeom>
-        </p:spPr>
-      </p:pic>
-      <p:pic>
-        <p:nvPicPr>
-          <p:cNvPr id="9" name="Picture 8">
-            <a:extLst>
-              <a:ext uri="{FF2B5EF4-FFF2-40B4-BE49-F238E27FC236}">
-                <a16:creationId xmlns:a16="http://schemas.microsoft.com/office/drawing/2014/main" id="{B7D17D01-1806-2D44-FF5F-33396119A516}"/>
-              </a:ext>
-            </a:extLst>
-          </p:cNvPr>
-          <p:cNvPicPr>
-            <a:picLocks noChangeAspect="1"/>
-          </p:cNvPicPr>
-          <p:nvPr/>
-        </p:nvPicPr>
-        <p:blipFill>
-          <a:blip r:embed="rId4"/>
-          <a:stretch>
-            <a:fillRect/>
-          </a:stretch>
-        </p:blipFill>
-        <p:spPr>
-          <a:xfrm>
-            <a:off x="5980490" y="1996399"/>
-            <a:ext cx="3084652" cy="2085865"/>
           </a:xfrm>
           <a:prstGeom prst="rect">
             <a:avLst/>
@@ -26282,7 +26282,7 @@
           <a:lstStyle/>
           <a:p>
             <a:pPr algn="ctr"/>
-            <a:endParaRPr lang="en-SG"/>
+            <a:endParaRPr lang="en-SG" dirty="0"/>
           </a:p>
         </p:txBody>
       </p:sp>
@@ -26373,7 +26373,7 @@
         </p:blipFill>
         <p:spPr>
           <a:xfrm>
-            <a:off x="2456483" y="1977783"/>
+            <a:off x="2456483" y="2005723"/>
             <a:ext cx="3119150" cy="2112793"/>
           </a:xfrm>
           <a:prstGeom prst="rect">

</xml_diff>